<commit_message>
fix mcsstrength -> mcstrength
</commit_message>
<xml_diff>
--- a/doc/GENESIS/sindo_genesis.pptx
+++ b/doc/GENESIS/sindo_genesis.pptx
@@ -235,7 +235,7 @@
           <a:p>
             <a:fld id="{E169DC26-B38B-F143-8CF0-891C5D30D367}" type="datetimeFigureOut">
               <a:rPr kumimoji="1" lang="ja-JP" altLang="en-US" smtClean="0"/>
-              <a:t>2019/11/13</a:t>
+              <a:t>2019/12/10</a:t>
             </a:fld>
             <a:endParaRPr kumimoji="1" lang="ja-JP" altLang="en-US"/>
           </a:p>
@@ -665,7 +665,7 @@
           <a:p>
             <a:fld id="{EE7860AB-3E3A-634E-9588-3634E3BE52A0}" type="datetime1">
               <a:rPr kumimoji="1" lang="ja-JP" altLang="en-US" smtClean="0"/>
-              <a:t>2019/11/13</a:t>
+              <a:t>2019/12/10</a:t>
             </a:fld>
             <a:endParaRPr kumimoji="1" lang="ja-JP" altLang="en-US"/>
           </a:p>
@@ -862,7 +862,7 @@
           <a:p>
             <a:fld id="{9F997464-49D2-A046-AC0E-5FDFD3DF665B}" type="datetime1">
               <a:rPr kumimoji="1" lang="ja-JP" altLang="en-US" smtClean="0"/>
-              <a:t>2019/11/13</a:t>
+              <a:t>2019/12/10</a:t>
             </a:fld>
             <a:endParaRPr kumimoji="1" lang="ja-JP" altLang="en-US"/>
           </a:p>
@@ -1069,7 +1069,7 @@
           <a:p>
             <a:fld id="{2CBD1245-BC8C-4342-A14F-D901B9B13210}" type="datetime1">
               <a:rPr kumimoji="1" lang="ja-JP" altLang="en-US" smtClean="0"/>
-              <a:t>2019/11/13</a:t>
+              <a:t>2019/12/10</a:t>
             </a:fld>
             <a:endParaRPr kumimoji="1" lang="ja-JP" altLang="en-US"/>
           </a:p>
@@ -1266,7 +1266,7 @@
           <a:p>
             <a:fld id="{E0FF5DFC-0E6C-E144-A5DD-E851AA0EE050}" type="datetime1">
               <a:rPr kumimoji="1" lang="ja-JP" altLang="en-US" smtClean="0"/>
-              <a:t>2019/11/13</a:t>
+              <a:t>2019/12/10</a:t>
             </a:fld>
             <a:endParaRPr kumimoji="1" lang="ja-JP" altLang="en-US"/>
           </a:p>
@@ -1505,7 +1505,7 @@
           <a:p>
             <a:fld id="{1373E6F4-CB37-3348-B268-694CC61CFDE2}" type="datetime1">
               <a:rPr kumimoji="1" lang="ja-JP" altLang="en-US" smtClean="0"/>
-              <a:t>2019/11/13</a:t>
+              <a:t>2019/12/10</a:t>
             </a:fld>
             <a:endParaRPr kumimoji="1" lang="ja-JP" altLang="en-US"/>
           </a:p>
@@ -1796,7 +1796,7 @@
           <a:p>
             <a:fld id="{83203CE9-A62D-D54F-B5B8-E5081BC50FF5}" type="datetime1">
               <a:rPr kumimoji="1" lang="ja-JP" altLang="en-US" smtClean="0"/>
-              <a:t>2019/11/13</a:t>
+              <a:t>2019/12/10</a:t>
             </a:fld>
             <a:endParaRPr kumimoji="1" lang="ja-JP" altLang="en-US"/>
           </a:p>
@@ -2222,7 +2222,7 @@
           <a:p>
             <a:fld id="{8DF792D3-1EAE-B941-8FA8-A45BDC58D538}" type="datetime1">
               <a:rPr kumimoji="1" lang="ja-JP" altLang="en-US" smtClean="0"/>
-              <a:t>2019/11/13</a:t>
+              <a:t>2019/12/10</a:t>
             </a:fld>
             <a:endParaRPr kumimoji="1" lang="ja-JP" altLang="en-US"/>
           </a:p>
@@ -2335,7 +2335,7 @@
           <a:p>
             <a:fld id="{A2976D4D-D591-7843-A186-DB885C000B62}" type="datetime1">
               <a:rPr kumimoji="1" lang="ja-JP" altLang="en-US" smtClean="0"/>
-              <a:t>2019/11/13</a:t>
+              <a:t>2019/12/10</a:t>
             </a:fld>
             <a:endParaRPr kumimoji="1" lang="ja-JP" altLang="en-US"/>
           </a:p>
@@ -2425,7 +2425,7 @@
           <a:p>
             <a:fld id="{71E10034-284E-534E-87ED-A26A40A9A5A4}" type="datetime1">
               <a:rPr kumimoji="1" lang="ja-JP" altLang="en-US" smtClean="0"/>
-              <a:t>2019/11/13</a:t>
+              <a:t>2019/12/10</a:t>
             </a:fld>
             <a:endParaRPr kumimoji="1" lang="ja-JP" altLang="en-US"/>
           </a:p>
@@ -2729,7 +2729,7 @@
           <a:p>
             <a:fld id="{1FB2FB92-4CFC-BF4B-81B2-16888C599581}" type="datetime1">
               <a:rPr kumimoji="1" lang="ja-JP" altLang="en-US" smtClean="0"/>
-              <a:t>2019/11/13</a:t>
+              <a:t>2019/12/10</a:t>
             </a:fld>
             <a:endParaRPr kumimoji="1" lang="ja-JP" altLang="en-US"/>
           </a:p>
@@ -2981,7 +2981,7 @@
           <a:p>
             <a:fld id="{43AF2432-0CDD-C544-BAB3-85372DA356EC}" type="datetime1">
               <a:rPr kumimoji="1" lang="ja-JP" altLang="en-US" smtClean="0"/>
-              <a:t>2019/11/13</a:t>
+              <a:t>2019/12/10</a:t>
             </a:fld>
             <a:endParaRPr kumimoji="1" lang="ja-JP" altLang="en-US"/>
           </a:p>
@@ -3221,7 +3221,7 @@
           <a:p>
             <a:fld id="{4A801117-FCED-794E-BE88-16E7FC9A3D9F}" type="datetime1">
               <a:rPr kumimoji="1" lang="ja-JP" altLang="en-US" smtClean="0"/>
-              <a:t>2019/11/13</a:t>
+              <a:t>2019/12/10</a:t>
             </a:fld>
             <a:endParaRPr kumimoji="1" lang="ja-JP" altLang="en-US"/>
           </a:p>
@@ -9953,7 +9953,7 @@
             </a:r>
             <a:r>
               <a:rPr lang="en-US" altLang="ja-JP" sz="1400" dirty="0" err="1"/>
-              <a:t>mcsstrength</a:t>
+              <a:t>mcstrength</a:t>
             </a:r>
             <a:r>
               <a:rPr lang="en-US" altLang="ja-JP" sz="1400" dirty="0"/>
@@ -12021,7 +12021,7 @@
             </a:r>
             <a:r>
               <a:rPr lang="en-US" altLang="ja-JP" dirty="0"/>
-              <a:t>_anharn to find the input files for </a:t>
+              <a:t>_anharm to find the input files for </a:t>
             </a:r>
             <a:r>
               <a:rPr lang="en-US" altLang="ja-JP" dirty="0" err="1"/>

</xml_diff>